<commit_message>
Cleaned up presentation from the Tech Review.
</commit_message>
<xml_diff>
--- a/docs/Data515TechReview.pptx
+++ b/docs/Data515TechReview.pptx
@@ -348,7 +348,7 @@
               <a:rPr lang="en-US" smtClean="0">
                 <a:latin typeface="Segoe UI" pitchFamily="34" charset="0"/>
               </a:rPr>
-              <a:t>5/14/2019</a:t>
+              <a:t>5/27/2019</a:t>
             </a:fld>
             <a:endParaRPr lang="en-US" dirty="0">
               <a:latin typeface="Segoe UI" pitchFamily="34" charset="0"/>
@@ -671,7 +671,7 @@
             <a:fld id="{D51B1278-D92B-4AF3-A9C1-71DD298190CE}" type="datetimeFigureOut">
               <a:rPr lang="en-US" smtClean="0"/>
               <a:pPr/>
-              <a:t>5/14/2019</a:t>
+              <a:t>5/27/2019</a:t>
             </a:fld>
             <a:endParaRPr lang="en-US" dirty="0"/>
           </a:p>
@@ -986,7 +986,7 @@
                 </a:solidFill>
               </a:rPr>
               <a:pPr/>
-              <a:t>5/14/2019</a:t>
+              <a:t>5/27/2019</a:t>
             </a:fld>
             <a:endParaRPr lang="en-US" dirty="0">
               <a:solidFill>
@@ -25024,7 +25024,7 @@
         <p:spPr>
           <a:xfrm>
             <a:off x="731837" y="1363662"/>
-            <a:ext cx="10287000" cy="5324535"/>
+            <a:ext cx="10287000" cy="5016758"/>
           </a:xfrm>
           <a:prstGeom prst="rect">
             <a:avLst/>
@@ -25768,7 +25768,7 @@
                 <a:ea typeface="+mn-ea"/>
                 <a:cs typeface="+mn-cs"/>
               </a:rPr>
-              <a:t>y_pred</a:t>
+              <a:t>clf</a:t>
             </a:r>
             <a:r>
               <a:rPr kumimoji="0" lang="en-US" sz="2000" b="0" i="0" u="none" strike="noStrike" kern="1200" cap="none" spc="0" normalizeH="0" baseline="0" noProof="0" dirty="0">
@@ -25825,121 +25825,7 @@
                 <a:ea typeface="+mn-ea"/>
                 <a:cs typeface="+mn-cs"/>
               </a:rPr>
-              <a:t>(</a:t>
-            </a:r>
-            <a:r>
-              <a:rPr kumimoji="0" lang="en-US" sz="2000" b="0" i="0" u="none" strike="noStrike" kern="1200" cap="none" spc="0" normalizeH="0" baseline="0" noProof="0" dirty="0" err="1">
-                <a:ln>
-                  <a:noFill/>
-                </a:ln>
-                <a:solidFill>
-                  <a:srgbClr val="505050">
-                    <a:lumMod val="50000"/>
-                  </a:srgbClr>
-                </a:solidFill>
-                <a:effectLst/>
-                <a:uLnTx/>
-                <a:uFillTx/>
-                <a:latin typeface="Consolas" panose="020B0609020204030204" pitchFamily="49" charset="0"/>
-                <a:ea typeface="+mn-ea"/>
-                <a:cs typeface="+mn-cs"/>
-              </a:rPr>
-              <a:t>iris.data</a:t>
-            </a:r>
-            <a:r>
-              <a:rPr kumimoji="0" lang="en-US" sz="2000" b="0" i="0" u="none" strike="noStrike" kern="1200" cap="none" spc="0" normalizeH="0" baseline="0" noProof="0" dirty="0">
-                <a:ln>
-                  <a:noFill/>
-                </a:ln>
-                <a:solidFill>
-                  <a:srgbClr val="505050">
-                    <a:lumMod val="50000"/>
-                  </a:srgbClr>
-                </a:solidFill>
-                <a:effectLst/>
-                <a:uLnTx/>
-                <a:uFillTx/>
-                <a:latin typeface="Consolas" panose="020B0609020204030204" pitchFamily="49" charset="0"/>
-                <a:ea typeface="+mn-ea"/>
-                <a:cs typeface="+mn-cs"/>
-              </a:rPr>
-              <a:t>, </a:t>
-            </a:r>
-            <a:r>
-              <a:rPr kumimoji="0" lang="en-US" sz="2000" b="0" i="0" u="none" strike="noStrike" kern="1200" cap="none" spc="0" normalizeH="0" baseline="0" noProof="0" dirty="0" err="1">
-                <a:ln>
-                  <a:noFill/>
-                </a:ln>
-                <a:solidFill>
-                  <a:srgbClr val="505050">
-                    <a:lumMod val="50000"/>
-                  </a:srgbClr>
-                </a:solidFill>
-                <a:effectLst/>
-                <a:uLnTx/>
-                <a:uFillTx/>
-                <a:latin typeface="Consolas" panose="020B0609020204030204" pitchFamily="49" charset="0"/>
-                <a:ea typeface="+mn-ea"/>
-                <a:cs typeface="+mn-cs"/>
-              </a:rPr>
-              <a:t>iris.target</a:t>
-            </a:r>
-            <a:r>
-              <a:rPr kumimoji="0" lang="en-US" sz="2000" b="0" i="0" u="none" strike="noStrike" kern="1200" cap="none" spc="0" normalizeH="0" baseline="0" noProof="0" dirty="0">
-                <a:ln>
-                  <a:noFill/>
-                </a:ln>
-                <a:solidFill>
-                  <a:srgbClr val="505050">
-                    <a:lumMod val="50000"/>
-                  </a:srgbClr>
-                </a:solidFill>
-                <a:effectLst/>
-                <a:uLnTx/>
-                <a:uFillTx/>
-                <a:latin typeface="Consolas" panose="020B0609020204030204" pitchFamily="49" charset="0"/>
-                <a:ea typeface="+mn-ea"/>
-                <a:cs typeface="+mn-cs"/>
-              </a:rPr>
-              <a:t>).predict(</a:t>
-            </a:r>
-            <a:r>
-              <a:rPr kumimoji="0" lang="en-US" sz="2000" b="0" i="0" u="none" strike="noStrike" kern="1200" cap="none" spc="0" normalizeH="0" baseline="0" noProof="0" dirty="0" err="1">
-                <a:ln>
-                  <a:noFill/>
-                </a:ln>
-                <a:solidFill>
-                  <a:srgbClr val="505050">
-                    <a:lumMod val="50000"/>
-                  </a:srgbClr>
-                </a:solidFill>
-                <a:effectLst/>
-                <a:uLnTx/>
-                <a:uFillTx/>
-                <a:latin typeface="Consolas" panose="020B0609020204030204" pitchFamily="49" charset="0"/>
-                <a:ea typeface="+mn-ea"/>
-                <a:cs typeface="+mn-cs"/>
-              </a:rPr>
-              <a:t>iris.data</a:t>
-            </a:r>
-            <a:r>
-              <a:rPr kumimoji="0" lang="en-US" sz="2000" b="0" i="0" u="none" strike="noStrike" kern="1200" cap="none" spc="0" normalizeH="0" baseline="0" noProof="0" dirty="0">
-                <a:ln>
-                  <a:noFill/>
-                </a:ln>
-                <a:solidFill>
-                  <a:srgbClr val="505050">
-                    <a:lumMod val="50000"/>
-                  </a:srgbClr>
-                </a:solidFill>
-                <a:effectLst/>
-                <a:uLnTx/>
-                <a:uFillTx/>
-                <a:latin typeface="Consolas" panose="020B0609020204030204" pitchFamily="49" charset="0"/>
-                <a:ea typeface="+mn-ea"/>
-                <a:cs typeface="+mn-cs"/>
-              </a:rPr>
-              <a:t>)</a:t>
+              <a:t>(iris.data, iris.target)</a:t>
             </a:r>
           </a:p>
           <a:p>
@@ -25966,7 +25852,9 @@
                   <a:noFill/>
                 </a:ln>
                 <a:solidFill>
-                  <a:srgbClr val="FFC000"/>
+                  <a:srgbClr val="505050">
+                    <a:lumMod val="50000"/>
+                  </a:srgbClr>
                 </a:solidFill>
                 <a:effectLst/>
                 <a:uLnTx/>
@@ -25975,7 +25863,26 @@
                 <a:ea typeface="+mn-ea"/>
                 <a:cs typeface="+mn-cs"/>
               </a:rPr>
-              <a:t>print</a:t>
+              <a:t>out = </a:t>
+            </a:r>
+            <a:r>
+              <a:rPr kumimoji="0" lang="en-US" sz="2000" b="0" i="0" u="none" strike="noStrike" kern="1200" cap="none" spc="0" normalizeH="0" baseline="0" noProof="0" dirty="0" err="1">
+                <a:ln>
+                  <a:noFill/>
+                </a:ln>
+                <a:solidFill>
+                  <a:srgbClr val="505050">
+                    <a:lumMod val="50000"/>
+                  </a:srgbClr>
+                </a:solidFill>
+                <a:effectLst/>
+                <a:uLnTx/>
+                <a:uFillTx/>
+                <a:latin typeface="Consolas" panose="020B0609020204030204" pitchFamily="49" charset="0"/>
+                <a:ea typeface="+mn-ea"/>
+                <a:cs typeface="+mn-cs"/>
+              </a:rPr>
+              <a:t>clf.predict</a:t>
             </a:r>
             <a:r>
               <a:rPr kumimoji="0" lang="en-US" sz="2000" b="0" i="0" u="none" strike="noStrike" kern="1200" cap="none" spc="0" normalizeH="0" baseline="0" noProof="0" dirty="0">
@@ -25994,17 +25901,34 @@
                 <a:ea typeface="+mn-ea"/>
                 <a:cs typeface="+mn-cs"/>
               </a:rPr>
-              <a:t>(</a:t>
-            </a:r>
-            <a:r>
-              <a:rPr kumimoji="0" lang="en-US" sz="2000" b="0" i="0" u="none" strike="noStrike" kern="1200" cap="none" spc="0" normalizeH="0" baseline="0" noProof="0" dirty="0" err="1">
+              <a:t>(iris.data)</a:t>
+            </a:r>
+          </a:p>
+          <a:p>
+            <a:pPr marL="0" marR="0" lvl="0" indent="0" algn="l" defTabSz="932742" rtl="0" eaLnBrk="1" fontAlgn="auto" latinLnBrk="0" hangingPunct="1">
+              <a:lnSpc>
+                <a:spcPct val="100000"/>
+              </a:lnSpc>
+              <a:spcBef>
+                <a:spcPts val="0"/>
+              </a:spcBef>
+              <a:spcAft>
+                <a:spcPts val="0"/>
+              </a:spcAft>
+              <a:buClrTx/>
+              <a:buSzTx/>
+              <a:buFontTx/>
+              <a:buNone/>
+              <a:tabLst/>
+              <a:defRPr/>
+            </a:pPr>
+            <a:r>
+              <a:rPr kumimoji="0" lang="en-US" sz="2000" b="0" i="0" u="none" strike="noStrike" kern="1200" cap="none" spc="0" normalizeH="0" baseline="0" noProof="0" dirty="0">
                 <a:ln>
                   <a:noFill/>
                 </a:ln>
                 <a:solidFill>
-                  <a:srgbClr val="505050">
-                    <a:lumMod val="50000"/>
-                  </a:srgbClr>
+                  <a:srgbClr val="FFC000"/>
                 </a:solidFill>
                 <a:effectLst/>
                 <a:uLnTx/>
@@ -26013,7 +25937,7 @@
                 <a:ea typeface="+mn-ea"/>
                 <a:cs typeface="+mn-cs"/>
               </a:rPr>
-              <a:t>y_pred</a:t>
+              <a:t>print</a:t>
             </a:r>
             <a:r>
               <a:rPr kumimoji="0" lang="en-US" sz="2000" b="0" i="0" u="none" strike="noStrike" kern="1200" cap="none" spc="0" normalizeH="0" baseline="0" noProof="0" dirty="0">
@@ -26032,7 +25956,7 @@
                 <a:ea typeface="+mn-ea"/>
                 <a:cs typeface="+mn-cs"/>
               </a:rPr>
-              <a:t>)</a:t>
+              <a:t>(out)</a:t>
             </a:r>
           </a:p>
           <a:p>
@@ -26107,194 +26031,6 @@
             </a:r>
           </a:p>
           <a:p>
-            <a:pPr marL="0" marR="0" lvl="0" indent="0" algn="l" defTabSz="932742" rtl="0" eaLnBrk="1" fontAlgn="auto" latinLnBrk="0" hangingPunct="1">
-              <a:lnSpc>
-                <a:spcPct val="100000"/>
-              </a:lnSpc>
-              <a:spcBef>
-                <a:spcPts val="0"/>
-              </a:spcBef>
-              <a:spcAft>
-                <a:spcPts val="0"/>
-              </a:spcAft>
-              <a:buClrTx/>
-              <a:buSzTx/>
-              <a:buFontTx/>
-              <a:buNone/>
-              <a:tabLst/>
-              <a:defRPr/>
-            </a:pPr>
-            <a:r>
-              <a:rPr kumimoji="0" lang="en-US" sz="2000" b="0" i="0" u="none" strike="noStrike" kern="1200" cap="none" spc="0" normalizeH="0" baseline="0" noProof="0" dirty="0">
-                <a:ln>
-                  <a:noFill/>
-                </a:ln>
-                <a:solidFill>
-                  <a:srgbClr val="505050">
-                    <a:lumMod val="50000"/>
-                  </a:srgbClr>
-                </a:solidFill>
-                <a:effectLst/>
-                <a:uLnTx/>
-                <a:uFillTx/>
-                <a:latin typeface="Consolas" panose="020B0609020204030204" pitchFamily="49" charset="0"/>
-                <a:ea typeface="+mn-ea"/>
-                <a:cs typeface="+mn-cs"/>
-              </a:rPr>
-              <a:t>X = </a:t>
-            </a:r>
-            <a:r>
-              <a:rPr kumimoji="0" lang="en-US" sz="2000" b="0" i="0" u="none" strike="noStrike" kern="1200" cap="none" spc="0" normalizeH="0" baseline="0" noProof="0" dirty="0" err="1">
-                <a:ln>
-                  <a:noFill/>
-                </a:ln>
-                <a:solidFill>
-                  <a:srgbClr val="505050">
-                    <a:lumMod val="50000"/>
-                  </a:srgbClr>
-                </a:solidFill>
-                <a:effectLst/>
-                <a:uLnTx/>
-                <a:uFillTx/>
-                <a:latin typeface="Consolas" panose="020B0609020204030204" pitchFamily="49" charset="0"/>
-                <a:ea typeface="+mn-ea"/>
-                <a:cs typeface="+mn-cs"/>
-              </a:rPr>
-              <a:t>iris.data</a:t>
-            </a:r>
-            <a:r>
-              <a:rPr kumimoji="0" lang="en-US" sz="2000" b="0" i="0" u="none" strike="noStrike" kern="1200" cap="none" spc="0" normalizeH="0" baseline="0" noProof="0" dirty="0">
-                <a:ln>
-                  <a:noFill/>
-                </a:ln>
-                <a:solidFill>
-                  <a:srgbClr val="505050">
-                    <a:lumMod val="50000"/>
-                  </a:srgbClr>
-                </a:solidFill>
-                <a:effectLst/>
-                <a:uLnTx/>
-                <a:uFillTx/>
-                <a:latin typeface="Consolas" panose="020B0609020204030204" pitchFamily="49" charset="0"/>
-                <a:ea typeface="+mn-ea"/>
-                <a:cs typeface="+mn-cs"/>
-              </a:rPr>
-              <a:t>[:, :</a:t>
-            </a:r>
-            <a:r>
-              <a:rPr kumimoji="0" lang="en-US" sz="2000" b="0" i="0" u="none" strike="noStrike" kern="1200" cap="none" spc="0" normalizeH="0" baseline="0" noProof="0" dirty="0">
-                <a:ln>
-                  <a:noFill/>
-                </a:ln>
-                <a:solidFill>
-                  <a:srgbClr val="0072C6">
-                    <a:lumMod val="40000"/>
-                    <a:lumOff val="60000"/>
-                  </a:srgbClr>
-                </a:solidFill>
-                <a:effectLst/>
-                <a:uLnTx/>
-                <a:uFillTx/>
-                <a:latin typeface="Consolas" panose="020B0609020204030204" pitchFamily="49" charset="0"/>
-                <a:ea typeface="+mn-ea"/>
-                <a:cs typeface="+mn-cs"/>
-              </a:rPr>
-              <a:t>2</a:t>
-            </a:r>
-            <a:r>
-              <a:rPr kumimoji="0" lang="en-US" sz="2000" b="0" i="0" u="none" strike="noStrike" kern="1200" cap="none" spc="0" normalizeH="0" baseline="0" noProof="0" dirty="0">
-                <a:ln>
-                  <a:noFill/>
-                </a:ln>
-                <a:solidFill>
-                  <a:srgbClr val="505050">
-                    <a:lumMod val="50000"/>
-                  </a:srgbClr>
-                </a:solidFill>
-                <a:effectLst/>
-                <a:uLnTx/>
-                <a:uFillTx/>
-                <a:latin typeface="Consolas" panose="020B0609020204030204" pitchFamily="49" charset="0"/>
-                <a:ea typeface="+mn-ea"/>
-                <a:cs typeface="+mn-cs"/>
-              </a:rPr>
-              <a:t>]</a:t>
-            </a:r>
-          </a:p>
-          <a:p>
-            <a:pPr marL="0" marR="0" lvl="0" indent="0" algn="l" defTabSz="932742" rtl="0" eaLnBrk="1" fontAlgn="auto" latinLnBrk="0" hangingPunct="1">
-              <a:lnSpc>
-                <a:spcPct val="100000"/>
-              </a:lnSpc>
-              <a:spcBef>
-                <a:spcPts val="0"/>
-              </a:spcBef>
-              <a:spcAft>
-                <a:spcPts val="0"/>
-              </a:spcAft>
-              <a:buClrTx/>
-              <a:buSzTx/>
-              <a:buFontTx/>
-              <a:buNone/>
-              <a:tabLst/>
-              <a:defRPr/>
-            </a:pPr>
-            <a:r>
-              <a:rPr kumimoji="0" lang="en-US" sz="2000" b="0" i="0" u="none" strike="noStrike" kern="1200" cap="none" spc="0" normalizeH="0" baseline="0" noProof="0" dirty="0">
-                <a:ln>
-                  <a:noFill/>
-                </a:ln>
-                <a:solidFill>
-                  <a:srgbClr val="505050">
-                    <a:lumMod val="50000"/>
-                  </a:srgbClr>
-                </a:solidFill>
-                <a:effectLst/>
-                <a:uLnTx/>
-                <a:uFillTx/>
-                <a:latin typeface="Consolas" panose="020B0609020204030204" pitchFamily="49" charset="0"/>
-                <a:ea typeface="+mn-ea"/>
-                <a:cs typeface="+mn-cs"/>
-              </a:rPr>
-              <a:t>y = </a:t>
-            </a:r>
-            <a:r>
-              <a:rPr kumimoji="0" lang="en-US" sz="2000" b="0" i="0" u="none" strike="noStrike" kern="1200" cap="none" spc="0" normalizeH="0" baseline="0" noProof="0" dirty="0" err="1">
-                <a:ln>
-                  <a:noFill/>
-                </a:ln>
-                <a:solidFill>
-                  <a:srgbClr val="505050">
-                    <a:lumMod val="50000"/>
-                  </a:srgbClr>
-                </a:solidFill>
-                <a:effectLst/>
-                <a:uLnTx/>
-                <a:uFillTx/>
-                <a:latin typeface="Consolas" panose="020B0609020204030204" pitchFamily="49" charset="0"/>
-                <a:ea typeface="+mn-ea"/>
-                <a:cs typeface="+mn-cs"/>
-              </a:rPr>
-              <a:t>iris.target</a:t>
-            </a:r>
-            <a:endParaRPr kumimoji="0" lang="en-US" sz="2000" b="0" i="0" u="none" strike="noStrike" kern="1200" cap="none" spc="0" normalizeH="0" baseline="0" noProof="0" dirty="0">
-              <a:ln>
-                <a:noFill/>
-              </a:ln>
-              <a:solidFill>
-                <a:srgbClr val="505050">
-                  <a:lumMod val="50000"/>
-                </a:srgbClr>
-              </a:solidFill>
-              <a:effectLst/>
-              <a:uLnTx/>
-              <a:uFillTx/>
-              <a:latin typeface="Consolas" panose="020B0609020204030204" pitchFamily="49" charset="0"/>
-              <a:ea typeface="+mn-ea"/>
-              <a:cs typeface="+mn-cs"/>
-            </a:endParaRPr>
-          </a:p>
-          <a:p>
             <a:pPr lvl="0"/>
             <a:r>
               <a:rPr lang="en-US" sz="2000" dirty="0" err="1">
@@ -26522,7 +26258,7 @@
                 </a:solidFill>
                 <a:latin typeface="Consolas" panose="020B0609020204030204" pitchFamily="49" charset="0"/>
               </a:rPr>
-              <a:t>(X, y)</a:t>
+              <a:t>(iris.data[:, :2], iris.target)</a:t>
             </a:r>
           </a:p>
           <a:p>
@@ -26558,7 +26294,7 @@
                 </a:solidFill>
                 <a:latin typeface="Consolas" panose="020B0609020204030204" pitchFamily="49" charset="0"/>
               </a:rPr>
-              <a:t>(X)</a:t>
+              <a:t>(iris.data[:, :2])</a:t>
             </a:r>
           </a:p>
           <a:p>
@@ -26653,7 +26389,14 @@
           <a:p>
             <a:r>
               <a:rPr lang="en-US" dirty="0"/>
-              <a:t>Machine Learning Models: Output</a:t>
+              <a:t>Machine Learning Models:</a:t>
+            </a:r>
+            <a:br>
+              <a:rPr lang="en-US" dirty="0"/>
+            </a:br>
+            <a:r>
+              <a:rPr lang="en-US" dirty="0"/>
+              <a:t>Output is not Interpretable</a:t>
             </a:r>
           </a:p>
         </p:txBody>
@@ -26672,7 +26415,7 @@
         </p:nvSpPr>
         <p:spPr>
           <a:xfrm>
-            <a:off x="960437" y="2506662"/>
+            <a:off x="960437" y="2735262"/>
             <a:ext cx="10287000" cy="2246769"/>
           </a:xfrm>
           <a:prstGeom prst="rect">
@@ -26821,8 +26564,8 @@
         </p:nvSpPr>
         <p:spPr>
           <a:xfrm>
-            <a:off x="731837" y="1516062"/>
-            <a:ext cx="10287000" cy="5293757"/>
+            <a:off x="731837" y="1408321"/>
+            <a:ext cx="10287000" cy="5601533"/>
           </a:xfrm>
           <a:prstGeom prst="rect">
             <a:avLst/>
@@ -27262,6 +27005,41 @@
                 <a:latin typeface="Consolas" panose="020B0609020204030204" pitchFamily="49" charset="0"/>
               </a:rPr>
               <a:t>)</a:t>
+            </a:r>
+          </a:p>
+          <a:p>
+            <a:r>
+              <a:rPr lang="en-US" sz="2000" dirty="0">
+                <a:solidFill>
+                  <a:schemeClr val="tx1">
+                    <a:lumMod val="50000"/>
+                  </a:schemeClr>
+                </a:solidFill>
+                <a:latin typeface="Consolas" panose="020B0609020204030204" pitchFamily="49" charset="0"/>
+              </a:rPr>
+              <a:t>out = </a:t>
+            </a:r>
+            <a:r>
+              <a:rPr lang="en-US" sz="2000" dirty="0" err="1">
+                <a:solidFill>
+                  <a:schemeClr val="tx1">
+                    <a:lumMod val="50000"/>
+                  </a:schemeClr>
+                </a:solidFill>
+                <a:latin typeface="Consolas" panose="020B0609020204030204" pitchFamily="49" charset="0"/>
+              </a:rPr>
+              <a:t>clf.predict</a:t>
+            </a:r>
+            <a:r>
+              <a:rPr lang="en-US" sz="2000" dirty="0">
+                <a:solidFill>
+                  <a:schemeClr val="tx1">
+                    <a:lumMod val="50000"/>
+                  </a:schemeClr>
+                </a:solidFill>
+                <a:latin typeface="Consolas" panose="020B0609020204030204" pitchFamily="49" charset="0"/>
+              </a:rPr>
+              <a:t>(iris.data)</a:t>
             </a:r>
           </a:p>
           <a:p>

</xml_diff>